<commit_message>
Update Digital control - lecture 4.pptx
Fix some typos and errors in lecture 4
</commit_message>
<xml_diff>
--- a/Digital control - lecture 4.pptx
+++ b/Digital control - lecture 4.pptx
@@ -275,7 +275,7 @@
           <a:p>
             <a:fld id="{EE9644A6-59D6-464D-AD1A-3A8F82524950}" type="datetimeFigureOut">
               <a:rPr lang="en-US" smtClean="0"/>
-              <a:t>3/17/2019</a:t>
+              <a:t>10/25/2019</a:t>
             </a:fld>
             <a:endParaRPr lang="en-US"/>
           </a:p>
@@ -473,7 +473,7 @@
           <a:p>
             <a:fld id="{EE9644A6-59D6-464D-AD1A-3A8F82524950}" type="datetimeFigureOut">
               <a:rPr lang="en-US" smtClean="0"/>
-              <a:t>3/17/2019</a:t>
+              <a:t>10/25/2019</a:t>
             </a:fld>
             <a:endParaRPr lang="en-US"/>
           </a:p>
@@ -681,7 +681,7 @@
           <a:p>
             <a:fld id="{EE9644A6-59D6-464D-AD1A-3A8F82524950}" type="datetimeFigureOut">
               <a:rPr lang="en-US" smtClean="0"/>
-              <a:t>3/17/2019</a:t>
+              <a:t>10/25/2019</a:t>
             </a:fld>
             <a:endParaRPr lang="en-US"/>
           </a:p>
@@ -879,7 +879,7 @@
           <a:p>
             <a:fld id="{EE9644A6-59D6-464D-AD1A-3A8F82524950}" type="datetimeFigureOut">
               <a:rPr lang="en-US" smtClean="0"/>
-              <a:t>3/17/2019</a:t>
+              <a:t>10/25/2019</a:t>
             </a:fld>
             <a:endParaRPr lang="en-US"/>
           </a:p>
@@ -1154,7 +1154,7 @@
           <a:p>
             <a:fld id="{EE9644A6-59D6-464D-AD1A-3A8F82524950}" type="datetimeFigureOut">
               <a:rPr lang="en-US" smtClean="0"/>
-              <a:t>3/17/2019</a:t>
+              <a:t>10/25/2019</a:t>
             </a:fld>
             <a:endParaRPr lang="en-US"/>
           </a:p>
@@ -1419,7 +1419,7 @@
           <a:p>
             <a:fld id="{EE9644A6-59D6-464D-AD1A-3A8F82524950}" type="datetimeFigureOut">
               <a:rPr lang="en-US" smtClean="0"/>
-              <a:t>3/17/2019</a:t>
+              <a:t>10/25/2019</a:t>
             </a:fld>
             <a:endParaRPr lang="en-US"/>
           </a:p>
@@ -1831,7 +1831,7 @@
           <a:p>
             <a:fld id="{EE9644A6-59D6-464D-AD1A-3A8F82524950}" type="datetimeFigureOut">
               <a:rPr lang="en-US" smtClean="0"/>
-              <a:t>3/17/2019</a:t>
+              <a:t>10/25/2019</a:t>
             </a:fld>
             <a:endParaRPr lang="en-US"/>
           </a:p>
@@ -1972,7 +1972,7 @@
           <a:p>
             <a:fld id="{EE9644A6-59D6-464D-AD1A-3A8F82524950}" type="datetimeFigureOut">
               <a:rPr lang="en-US" smtClean="0"/>
-              <a:t>3/17/2019</a:t>
+              <a:t>10/25/2019</a:t>
             </a:fld>
             <a:endParaRPr lang="en-US"/>
           </a:p>
@@ -2085,7 +2085,7 @@
           <a:p>
             <a:fld id="{EE9644A6-59D6-464D-AD1A-3A8F82524950}" type="datetimeFigureOut">
               <a:rPr lang="en-US" smtClean="0"/>
-              <a:t>3/17/2019</a:t>
+              <a:t>10/25/2019</a:t>
             </a:fld>
             <a:endParaRPr lang="en-US"/>
           </a:p>
@@ -2396,7 +2396,7 @@
           <a:p>
             <a:fld id="{EE9644A6-59D6-464D-AD1A-3A8F82524950}" type="datetimeFigureOut">
               <a:rPr lang="en-US" smtClean="0"/>
-              <a:t>3/17/2019</a:t>
+              <a:t>10/25/2019</a:t>
             </a:fld>
             <a:endParaRPr lang="en-US"/>
           </a:p>
@@ -2684,7 +2684,7 @@
           <a:p>
             <a:fld id="{EE9644A6-59D6-464D-AD1A-3A8F82524950}" type="datetimeFigureOut">
               <a:rPr lang="en-US" smtClean="0"/>
-              <a:t>3/17/2019</a:t>
+              <a:t>10/25/2019</a:t>
             </a:fld>
             <a:endParaRPr lang="en-US"/>
           </a:p>
@@ -2925,7 +2925,7 @@
           <a:p>
             <a:fld id="{EE9644A6-59D6-464D-AD1A-3A8F82524950}" type="datetimeFigureOut">
               <a:rPr lang="en-US" smtClean="0"/>
-              <a:t>3/17/2019</a:t>
+              <a:t>10/25/2019</a:t>
             </a:fld>
             <a:endParaRPr lang="en-US"/>
           </a:p>
@@ -3999,8 +3999,8 @@
           </a:p>
         </p:txBody>
       </p:sp>
-      <mc:AlternateContent xmlns:mc="http://schemas.openxmlformats.org/markup-compatibility/2006">
-        <mc:Choice xmlns:a14="http://schemas.microsoft.com/office/drawing/2010/main" Requires="a14">
+      <mc:AlternateContent xmlns:mc="http://schemas.openxmlformats.org/markup-compatibility/2006" xmlns:a14="http://schemas.microsoft.com/office/drawing/2010/main">
+        <mc:Choice Requires="a14">
           <p:sp>
             <p:nvSpPr>
               <p:cNvPr id="16" name="Object 5">
@@ -4166,7 +4166,7 @@
             </p:txBody>
           </p:sp>
         </mc:Choice>
-        <mc:Fallback>
+        <mc:Fallback xmlns="">
           <p:sp>
             <p:nvSpPr>
               <p:cNvPr id="16" name="Object 5">
@@ -4256,8 +4256,8 @@
           </a:p>
         </p:txBody>
       </p:sp>
-      <mc:AlternateContent xmlns:mc="http://schemas.openxmlformats.org/markup-compatibility/2006">
-        <mc:Choice xmlns:a14="http://schemas.microsoft.com/office/drawing/2010/main" Requires="a14">
+      <mc:AlternateContent xmlns:mc="http://schemas.openxmlformats.org/markup-compatibility/2006" xmlns:a14="http://schemas.microsoft.com/office/drawing/2010/main">
+        <mc:Choice Requires="a14">
           <p:sp>
             <p:nvSpPr>
               <p:cNvPr id="19" name="Object 7">
@@ -4665,7 +4665,7 @@
             </p:txBody>
           </p:sp>
         </mc:Choice>
-        <mc:Fallback>
+        <mc:Fallback xmlns="">
           <p:sp>
             <p:nvSpPr>
               <p:cNvPr id="19" name="Object 7">
@@ -4880,8 +4880,8 @@
                           </m:ctrlPr>
                         </m:dPr>
                         <m:e>
-                          <m:f>
-                            <m:fPr>
+                          <m:sSup>
+                            <m:sSupPr>
                               <m:ctrlPr>
                                 <a:rPr lang="en-US" sz="2000" i="1">
                                   <a:solidFill>
@@ -4890,16 +4890,28 @@
                                   <a:latin typeface="Cambria Math" panose="02040503050406030204" pitchFamily="18" charset="0"/>
                                 </a:rPr>
                               </m:ctrlPr>
-                            </m:fPr>
-                            <m:num>
+                            </m:sSupPr>
+                            <m:e>
                               <m:r>
-                                <a:rPr lang="en-US" sz="2000" b="0" i="1" smtClean="0">
+                                <a:rPr lang="en-US" sz="2000" i="1">
+                                  <a:solidFill>
+                                    <a:srgbClr val="000000"/>
+                                  </a:solidFill>
+                                  <a:latin typeface="Cambria Math" panose="02040503050406030204" pitchFamily="18" charset="0"/>
+                                  <a:ea typeface="Cambria Math" panose="02040503050406030204" pitchFamily="18" charset="0"/>
+                                </a:rPr>
+                                <m:t>ℒ</m:t>
+                              </m:r>
+                            </m:e>
+                            <m:sup>
+                              <m:r>
+                                <a:rPr lang="en-US" sz="2000" i="1">
                                   <a:solidFill>
                                     <a:srgbClr val="000000"/>
                                   </a:solidFill>
                                   <a:latin typeface="Cambria Math" panose="02040503050406030204" pitchFamily="18" charset="0"/>
                                 </a:rPr>
-                                <m:t>𝐻</m:t>
+                                <m:t>−</m:t>
                               </m:r>
                               <m:r>
                                 <a:rPr lang="en-US" sz="2000" i="1">
@@ -4908,39 +4920,86 @@
                                   </a:solidFill>
                                   <a:latin typeface="Cambria Math" panose="02040503050406030204" pitchFamily="18" charset="0"/>
                                 </a:rPr>
-                                <m:t>(</m:t>
+                                <m:t>1</m:t>
                               </m:r>
-                              <m:r>
+                            </m:sup>
+                          </m:sSup>
+                          <m:d>
+                            <m:dPr>
+                              <m:ctrlPr>
                                 <a:rPr lang="en-US" sz="2000" i="1">
                                   <a:solidFill>
                                     <a:srgbClr val="000000"/>
                                   </a:solidFill>
                                   <a:latin typeface="Cambria Math" panose="02040503050406030204" pitchFamily="18" charset="0"/>
+                                  <a:ea typeface="Cambria Math" panose="02040503050406030204" pitchFamily="18" charset="0"/>
                                 </a:rPr>
-                                <m:t>𝑆</m:t>
-                              </m:r>
-                              <m:r>
-                                <a:rPr lang="en-US" sz="2000" i="1">
-                                  <a:solidFill>
-                                    <a:srgbClr val="000000"/>
-                                  </a:solidFill>
-                                  <a:latin typeface="Cambria Math" panose="02040503050406030204" pitchFamily="18" charset="0"/>
-                                </a:rPr>
-                                <m:t>)</m:t>
-                              </m:r>
-                            </m:num>
-                            <m:den>
-                              <m:r>
-                                <a:rPr lang="en-US" sz="2000" i="1">
-                                  <a:solidFill>
-                                    <a:srgbClr val="000000"/>
-                                  </a:solidFill>
-                                  <a:latin typeface="Cambria Math" panose="02040503050406030204" pitchFamily="18" charset="0"/>
-                                </a:rPr>
-                                <m:t>𝑆</m:t>
-                              </m:r>
-                            </m:den>
-                          </m:f>
+                              </m:ctrlPr>
+                            </m:dPr>
+                            <m:e>
+                              <m:f>
+                                <m:fPr>
+                                  <m:ctrlPr>
+                                    <a:rPr lang="en-US" sz="2000" i="1">
+                                      <a:solidFill>
+                                        <a:srgbClr val="000000"/>
+                                      </a:solidFill>
+                                      <a:latin typeface="Cambria Math" panose="02040503050406030204" pitchFamily="18" charset="0"/>
+                                    </a:rPr>
+                                  </m:ctrlPr>
+                                </m:fPr>
+                                <m:num>
+                                  <m:r>
+                                    <a:rPr lang="en-US" sz="2000" b="0" i="1" smtClean="0">
+                                      <a:solidFill>
+                                        <a:srgbClr val="000000"/>
+                                      </a:solidFill>
+                                      <a:latin typeface="Cambria Math" panose="02040503050406030204" pitchFamily="18" charset="0"/>
+                                    </a:rPr>
+                                    <m:t>𝐻</m:t>
+                                  </m:r>
+                                  <m:r>
+                                    <a:rPr lang="en-US" sz="2000" i="1">
+                                      <a:solidFill>
+                                        <a:srgbClr val="000000"/>
+                                      </a:solidFill>
+                                      <a:latin typeface="Cambria Math" panose="02040503050406030204" pitchFamily="18" charset="0"/>
+                                    </a:rPr>
+                                    <m:t>(</m:t>
+                                  </m:r>
+                                  <m:r>
+                                    <a:rPr lang="en-US" sz="2000" i="1">
+                                      <a:solidFill>
+                                        <a:srgbClr val="000000"/>
+                                      </a:solidFill>
+                                      <a:latin typeface="Cambria Math" panose="02040503050406030204" pitchFamily="18" charset="0"/>
+                                    </a:rPr>
+                                    <m:t>𝑆</m:t>
+                                  </m:r>
+                                  <m:r>
+                                    <a:rPr lang="en-US" sz="2000" i="1">
+                                      <a:solidFill>
+                                        <a:srgbClr val="000000"/>
+                                      </a:solidFill>
+                                      <a:latin typeface="Cambria Math" panose="02040503050406030204" pitchFamily="18" charset="0"/>
+                                    </a:rPr>
+                                    <m:t>)</m:t>
+                                  </m:r>
+                                </m:num>
+                                <m:den>
+                                  <m:r>
+                                    <a:rPr lang="en-US" sz="2000" i="1">
+                                      <a:solidFill>
+                                        <a:srgbClr val="000000"/>
+                                      </a:solidFill>
+                                      <a:latin typeface="Cambria Math" panose="02040503050406030204" pitchFamily="18" charset="0"/>
+                                    </a:rPr>
+                                    <m:t>𝑆</m:t>
+                                  </m:r>
+                                </m:den>
+                              </m:f>
+                            </m:e>
+                          </m:d>
                         </m:e>
                       </m:d>
                       <m:r>
@@ -5367,39 +5426,6 @@
           </p:sp>
         </mc:Fallback>
       </mc:AlternateContent>
-      <p:sp>
-        <p:nvSpPr>
-          <p:cNvPr id="22" name="Object 5">
-            <a:extLst>
-              <a:ext uri="{FF2B5EF4-FFF2-40B4-BE49-F238E27FC236}">
-                <a16:creationId xmlns:a16="http://schemas.microsoft.com/office/drawing/2014/main" id="{1B9661DF-D1ED-49B1-AE31-C3B7167E4E30}"/>
-              </a:ext>
-            </a:extLst>
-          </p:cNvPr>
-          <p:cNvSpPr txBox="1"/>
-          <p:nvPr/>
-        </p:nvSpPr>
-        <p:spPr bwMode="auto">
-          <a:xfrm>
-            <a:off x="295275" y="4495800"/>
-            <a:ext cx="2676525" cy="919163"/>
-          </a:xfrm>
-          <a:prstGeom prst="rect">
-            <a:avLst/>
-          </a:prstGeom>
-          <a:noFill/>
-        </p:spPr>
-        <p:txBody>
-          <a:bodyPr>
-            <a:normAutofit/>
-          </a:bodyPr>
-          <a:lstStyle/>
-          <a:p>
-            <a:pPr/>
-            <a:endParaRPr lang="en-US" sz="2400" dirty="0"/>
-          </a:p>
-        </p:txBody>
-      </p:sp>
       <mc:AlternateContent xmlns:mc="http://schemas.openxmlformats.org/markup-compatibility/2006">
         <mc:Choice xmlns:a14="http://schemas.microsoft.com/office/drawing/2010/main" Requires="a14">
           <p:sp>
@@ -5416,8 +5442,8 @@
             </p:nvSpPr>
             <p:spPr bwMode="auto">
               <a:xfrm>
-                <a:off x="2176834" y="4176236"/>
-                <a:ext cx="7838326" cy="919164"/>
+                <a:off x="1338636" y="4176236"/>
+                <a:ext cx="8676524" cy="919164"/>
               </a:xfrm>
               <a:prstGeom prst="rect">
                 <a:avLst/>
@@ -5579,8 +5605,8 @@
                           </m:ctrlPr>
                         </m:dPr>
                         <m:e>
-                          <m:f>
-                            <m:fPr>
+                          <m:sSup>
+                            <m:sSupPr>
                               <m:ctrlPr>
                                 <a:rPr lang="en-US" sz="2000" i="1">
                                   <a:solidFill>
@@ -5589,8 +5615,20 @@
                                   <a:latin typeface="Cambria Math" panose="02040503050406030204" pitchFamily="18" charset="0"/>
                                 </a:rPr>
                               </m:ctrlPr>
-                            </m:fPr>
-                            <m:num>
+                            </m:sSupPr>
+                            <m:e>
+                              <m:r>
+                                <a:rPr lang="en-US" sz="2000" i="1">
+                                  <a:solidFill>
+                                    <a:srgbClr val="000000"/>
+                                  </a:solidFill>
+                                  <a:latin typeface="Cambria Math" panose="02040503050406030204" pitchFamily="18" charset="0"/>
+                                  <a:ea typeface="Cambria Math" panose="02040503050406030204" pitchFamily="18" charset="0"/>
+                                </a:rPr>
+                                <m:t>ℒ</m:t>
+                              </m:r>
+                            </m:e>
+                            <m:sup>
                               <m:r>
                                 <a:rPr lang="en-US" sz="2000" i="1">
                                   <a:solidFill>
@@ -5609,53 +5647,22 @@
                                 </a:rPr>
                                 <m:t>1</m:t>
                               </m:r>
-                            </m:num>
-                            <m:den>
-                              <m:r>
-                                <a:rPr lang="en-US" sz="2000" i="1">
-                                  <a:solidFill>
-                                    <a:srgbClr val="000000"/>
-                                  </a:solidFill>
-                                  <a:latin typeface="Cambria Math" panose="02040503050406030204" pitchFamily="18" charset="0"/>
-                                </a:rPr>
-                                <m:t>𝑆</m:t>
-                              </m:r>
-                            </m:den>
-                          </m:f>
-                          <m:r>
-                            <a:rPr lang="en-US" sz="2000" i="1">
-                              <a:solidFill>
-                                <a:srgbClr val="000000"/>
-                              </a:solidFill>
-                              <a:latin typeface="Cambria Math" panose="02040503050406030204" pitchFamily="18" charset="0"/>
-                            </a:rPr>
-                            <m:t>+</m:t>
-                          </m:r>
-                          <m:f>
-                            <m:fPr>
+                            </m:sup>
+                          </m:sSup>
+                          <m:d>
+                            <m:dPr>
                               <m:ctrlPr>
-                                <a:rPr lang="en-US" sz="2000" i="1">
+                                <a:rPr lang="en-US" sz="2000" i="1" smtClean="0">
                                   <a:solidFill>
                                     <a:srgbClr val="000000"/>
                                   </a:solidFill>
                                   <a:latin typeface="Cambria Math" panose="02040503050406030204" pitchFamily="18" charset="0"/>
                                 </a:rPr>
                               </m:ctrlPr>
-                            </m:fPr>
-                            <m:num>
-                              <m:r>
-                                <a:rPr lang="en-US" sz="2000" i="1">
-                                  <a:solidFill>
-                                    <a:srgbClr val="000000"/>
-                                  </a:solidFill>
-                                  <a:latin typeface="Cambria Math" panose="02040503050406030204" pitchFamily="18" charset="0"/>
-                                </a:rPr>
-                                <m:t>2</m:t>
-                              </m:r>
-                            </m:num>
-                            <m:den>
-                              <m:sSup>
-                                <m:sSupPr>
+                            </m:dPr>
+                            <m:e>
+                              <m:f>
+                                <m:fPr>
                                   <m:ctrlPr>
                                     <a:rPr lang="en-US" sz="2000" i="1">
                                       <a:solidFill>
@@ -5664,8 +5671,28 @@
                                       <a:latin typeface="Cambria Math" panose="02040503050406030204" pitchFamily="18" charset="0"/>
                                     </a:rPr>
                                   </m:ctrlPr>
-                                </m:sSupPr>
-                                <m:e>
+                                </m:fPr>
+                                <m:num>
+                                  <m:r>
+                                    <a:rPr lang="en-US" sz="2000" i="1">
+                                      <a:solidFill>
+                                        <a:srgbClr val="000000"/>
+                                      </a:solidFill>
+                                      <a:latin typeface="Cambria Math" panose="02040503050406030204" pitchFamily="18" charset="0"/>
+                                    </a:rPr>
+                                    <m:t>−</m:t>
+                                  </m:r>
+                                  <m:r>
+                                    <a:rPr lang="en-US" sz="2000" i="1">
+                                      <a:solidFill>
+                                        <a:srgbClr val="000000"/>
+                                      </a:solidFill>
+                                      <a:latin typeface="Cambria Math" panose="02040503050406030204" pitchFamily="18" charset="0"/>
+                                    </a:rPr>
+                                    <m:t>1</m:t>
+                                  </m:r>
+                                </m:num>
+                                <m:den>
                                   <m:r>
                                     <a:rPr lang="en-US" sz="2000" i="1">
                                       <a:solidFill>
@@ -5675,8 +5702,29 @@
                                     </a:rPr>
                                     <m:t>𝑆</m:t>
                                   </m:r>
-                                </m:e>
-                                <m:sup>
+                                </m:den>
+                              </m:f>
+                              <m:r>
+                                <a:rPr lang="en-US" sz="2000" i="1">
+                                  <a:solidFill>
+                                    <a:srgbClr val="000000"/>
+                                  </a:solidFill>
+                                  <a:latin typeface="Cambria Math" panose="02040503050406030204" pitchFamily="18" charset="0"/>
+                                </a:rPr>
+                                <m:t>+</m:t>
+                              </m:r>
+                              <m:f>
+                                <m:fPr>
+                                  <m:ctrlPr>
+                                    <a:rPr lang="en-US" sz="2000" i="1">
+                                      <a:solidFill>
+                                        <a:srgbClr val="000000"/>
+                                      </a:solidFill>
+                                      <a:latin typeface="Cambria Math" panose="02040503050406030204" pitchFamily="18" charset="0"/>
+                                    </a:rPr>
+                                  </m:ctrlPr>
+                                </m:fPr>
+                                <m:num>
                                   <m:r>
                                     <a:rPr lang="en-US" sz="2000" i="1">
                                       <a:solidFill>
@@ -5686,51 +5734,44 @@
                                     </a:rPr>
                                     <m:t>2</m:t>
                                   </m:r>
-                                </m:sup>
-                              </m:sSup>
-                            </m:den>
-                          </m:f>
-                          <m:r>
-                            <a:rPr lang="en-US" sz="2000" i="1">
-                              <a:solidFill>
-                                <a:srgbClr val="000000"/>
-                              </a:solidFill>
-                              <a:latin typeface="Cambria Math" panose="02040503050406030204" pitchFamily="18" charset="0"/>
-                            </a:rPr>
-                            <m:t>+</m:t>
-                          </m:r>
-                          <m:f>
-                            <m:fPr>
-                              <m:ctrlPr>
-                                <a:rPr lang="en-US" sz="2000" i="1">
-                                  <a:solidFill>
-                                    <a:srgbClr val="000000"/>
-                                  </a:solidFill>
-                                  <a:latin typeface="Cambria Math" panose="02040503050406030204" pitchFamily="18" charset="0"/>
-                                </a:rPr>
-                              </m:ctrlPr>
-                            </m:fPr>
-                            <m:num>
-                              <m:r>
-                                <a:rPr lang="en-US" sz="2000" i="1">
-                                  <a:solidFill>
-                                    <a:srgbClr val="000000"/>
-                                  </a:solidFill>
-                                  <a:latin typeface="Cambria Math" panose="02040503050406030204" pitchFamily="18" charset="0"/>
-                                </a:rPr>
-                                <m:t>1</m:t>
-                              </m:r>
-                            </m:num>
-                            <m:den>
-                              <m:r>
-                                <a:rPr lang="en-US" sz="2000" i="1">
-                                  <a:solidFill>
-                                    <a:srgbClr val="000000"/>
-                                  </a:solidFill>
-                                  <a:latin typeface="Cambria Math" panose="02040503050406030204" pitchFamily="18" charset="0"/>
-                                </a:rPr>
-                                <m:t>𝑆</m:t>
-                              </m:r>
+                                </m:num>
+                                <m:den>
+                                  <m:sSup>
+                                    <m:sSupPr>
+                                      <m:ctrlPr>
+                                        <a:rPr lang="en-US" sz="2000" i="1">
+                                          <a:solidFill>
+                                            <a:srgbClr val="000000"/>
+                                          </a:solidFill>
+                                          <a:latin typeface="Cambria Math" panose="02040503050406030204" pitchFamily="18" charset="0"/>
+                                        </a:rPr>
+                                      </m:ctrlPr>
+                                    </m:sSupPr>
+                                    <m:e>
+                                      <m:r>
+                                        <a:rPr lang="en-US" sz="2000" i="1">
+                                          <a:solidFill>
+                                            <a:srgbClr val="000000"/>
+                                          </a:solidFill>
+                                          <a:latin typeface="Cambria Math" panose="02040503050406030204" pitchFamily="18" charset="0"/>
+                                        </a:rPr>
+                                        <m:t>𝑆</m:t>
+                                      </m:r>
+                                    </m:e>
+                                    <m:sup>
+                                      <m:r>
+                                        <a:rPr lang="en-US" sz="2000" i="1">
+                                          <a:solidFill>
+                                            <a:srgbClr val="000000"/>
+                                          </a:solidFill>
+                                          <a:latin typeface="Cambria Math" panose="02040503050406030204" pitchFamily="18" charset="0"/>
+                                        </a:rPr>
+                                        <m:t>2</m:t>
+                                      </m:r>
+                                    </m:sup>
+                                  </m:sSup>
+                                </m:den>
+                              </m:f>
                               <m:r>
                                 <a:rPr lang="en-US" sz="2000" i="1">
                                   <a:solidFill>
@@ -5740,17 +5781,60 @@
                                 </a:rPr>
                                 <m:t>+</m:t>
                               </m:r>
-                              <m:r>
-                                <a:rPr lang="en-US" sz="2000" i="1">
-                                  <a:solidFill>
-                                    <a:srgbClr val="000000"/>
-                                  </a:solidFill>
-                                  <a:latin typeface="Cambria Math" panose="02040503050406030204" pitchFamily="18" charset="0"/>
-                                </a:rPr>
-                                <m:t>2</m:t>
-                              </m:r>
-                            </m:den>
-                          </m:f>
+                              <m:f>
+                                <m:fPr>
+                                  <m:ctrlPr>
+                                    <a:rPr lang="en-US" sz="2000" i="1">
+                                      <a:solidFill>
+                                        <a:srgbClr val="000000"/>
+                                      </a:solidFill>
+                                      <a:latin typeface="Cambria Math" panose="02040503050406030204" pitchFamily="18" charset="0"/>
+                                    </a:rPr>
+                                  </m:ctrlPr>
+                                </m:fPr>
+                                <m:num>
+                                  <m:r>
+                                    <a:rPr lang="en-US" sz="2000" i="1">
+                                      <a:solidFill>
+                                        <a:srgbClr val="000000"/>
+                                      </a:solidFill>
+                                      <a:latin typeface="Cambria Math" panose="02040503050406030204" pitchFamily="18" charset="0"/>
+                                    </a:rPr>
+                                    <m:t>1</m:t>
+                                  </m:r>
+                                </m:num>
+                                <m:den>
+                                  <m:r>
+                                    <a:rPr lang="en-US" sz="2000" i="1">
+                                      <a:solidFill>
+                                        <a:srgbClr val="000000"/>
+                                      </a:solidFill>
+                                      <a:latin typeface="Cambria Math" panose="02040503050406030204" pitchFamily="18" charset="0"/>
+                                    </a:rPr>
+                                    <m:t>𝑆</m:t>
+                                  </m:r>
+                                  <m:r>
+                                    <a:rPr lang="en-US" sz="2000" i="1">
+                                      <a:solidFill>
+                                        <a:srgbClr val="000000"/>
+                                      </a:solidFill>
+                                      <a:latin typeface="Cambria Math" panose="02040503050406030204" pitchFamily="18" charset="0"/>
+                                    </a:rPr>
+                                    <m:t>+</m:t>
+                                  </m:r>
+                                  <m:r>
+                                    <a:rPr lang="en-US" sz="2000" i="1">
+                                      <a:solidFill>
+                                        <a:srgbClr val="000000"/>
+                                      </a:solidFill>
+                                      <a:latin typeface="Cambria Math" panose="02040503050406030204" pitchFamily="18" charset="0"/>
+                                    </a:rPr>
+                                    <m:t>2</m:t>
+                                  </m:r>
+                                </m:den>
+                              </m:f>
+                            </m:e>
+                          </m:d>
                         </m:e>
                       </m:d>
                       <m:r>
@@ -5996,8 +6080,8 @@
             </p:nvSpPr>
             <p:spPr bwMode="auto">
               <a:xfrm>
-                <a:off x="2176834" y="4176236"/>
-                <a:ext cx="7838326" cy="919164"/>
+                <a:off x="1338636" y="4176236"/>
+                <a:ext cx="8676524" cy="919164"/>
               </a:xfrm>
               <a:prstGeom prst="rect">
                 <a:avLst/>
@@ -6024,8 +6108,8 @@
           </p:sp>
         </mc:Fallback>
       </mc:AlternateContent>
-      <mc:AlternateContent xmlns:mc="http://schemas.openxmlformats.org/markup-compatibility/2006">
-        <mc:Choice xmlns:a14="http://schemas.microsoft.com/office/drawing/2010/main" Requires="a14">
+      <mc:AlternateContent xmlns:mc="http://schemas.openxmlformats.org/markup-compatibility/2006" xmlns:a14="http://schemas.microsoft.com/office/drawing/2010/main">
+        <mc:Choice Requires="a14">
           <p:sp>
             <p:nvSpPr>
               <p:cNvPr id="33" name="Object 5">
@@ -6924,13 +7008,12 @@
                 <a:endParaRPr lang="en-US" sz="2000" dirty="0"/>
               </a:p>
               <a:p>
-                <a:pPr/>
                 <a:endParaRPr lang="en-US" sz="2000" dirty="0"/>
               </a:p>
             </p:txBody>
           </p:sp>
         </mc:Choice>
-        <mc:Fallback>
+        <mc:Fallback xmlns="">
           <p:sp>
             <p:nvSpPr>
               <p:cNvPr id="33" name="Object 5">
@@ -7614,8 +7697,8 @@
           </a:p>
         </p:txBody>
       </p:sp>
-      <mc:AlternateContent xmlns:mc="http://schemas.openxmlformats.org/markup-compatibility/2006">
-        <mc:Choice xmlns:a14="http://schemas.microsoft.com/office/drawing/2010/main" Requires="a14">
+      <mc:AlternateContent xmlns:mc="http://schemas.openxmlformats.org/markup-compatibility/2006" xmlns:a14="http://schemas.microsoft.com/office/drawing/2010/main">
+        <mc:Choice Requires="a14">
           <p:sp>
             <p:nvSpPr>
               <p:cNvPr id="19" name="Object 7">
@@ -8029,11 +8112,12 @@
                     </m:oMath>
                   </m:oMathPara>
                 </a14:m>
+                <a:endParaRPr/>
               </a:p>
             </p:txBody>
           </p:sp>
         </mc:Choice>
-        <mc:Fallback>
+        <mc:Fallback xmlns="">
           <p:sp>
             <p:nvSpPr>
               <p:cNvPr id="19" name="Object 7">
@@ -8248,8 +8332,8 @@
                           </m:ctrlPr>
                         </m:dPr>
                         <m:e>
-                          <m:f>
-                            <m:fPr>
+                          <m:sSup>
+                            <m:sSupPr>
                               <m:ctrlPr>
                                 <a:rPr lang="en-US" sz="2000" i="1">
                                   <a:solidFill>
@@ -8258,16 +8342,28 @@
                                   <a:latin typeface="Cambria Math" panose="02040503050406030204" pitchFamily="18" charset="0"/>
                                 </a:rPr>
                               </m:ctrlPr>
-                            </m:fPr>
-                            <m:num>
+                            </m:sSupPr>
+                            <m:e>
                               <m:r>
-                                <a:rPr lang="en-US" sz="2000" b="0" i="1" smtClean="0">
+                                <a:rPr lang="en-US" sz="2000" i="1">
+                                  <a:solidFill>
+                                    <a:srgbClr val="000000"/>
+                                  </a:solidFill>
+                                  <a:latin typeface="Cambria Math" panose="02040503050406030204" pitchFamily="18" charset="0"/>
+                                  <a:ea typeface="Cambria Math" panose="02040503050406030204" pitchFamily="18" charset="0"/>
+                                </a:rPr>
+                                <m:t>ℒ</m:t>
+                              </m:r>
+                            </m:e>
+                            <m:sup>
+                              <m:r>
+                                <a:rPr lang="en-US" sz="2000" i="1">
                                   <a:solidFill>
                                     <a:srgbClr val="000000"/>
                                   </a:solidFill>
                                   <a:latin typeface="Cambria Math" panose="02040503050406030204" pitchFamily="18" charset="0"/>
                                 </a:rPr>
-                                <m:t>𝐻</m:t>
+                                <m:t>−</m:t>
                               </m:r>
                               <m:r>
                                 <a:rPr lang="en-US" sz="2000" i="1">
@@ -8276,39 +8372,86 @@
                                   </a:solidFill>
                                   <a:latin typeface="Cambria Math" panose="02040503050406030204" pitchFamily="18" charset="0"/>
                                 </a:rPr>
-                                <m:t>(</m:t>
+                                <m:t>1</m:t>
                               </m:r>
-                              <m:r>
+                            </m:sup>
+                          </m:sSup>
+                          <m:d>
+                            <m:dPr>
+                              <m:ctrlPr>
                                 <a:rPr lang="en-US" sz="2000" i="1">
                                   <a:solidFill>
                                     <a:srgbClr val="000000"/>
                                   </a:solidFill>
                                   <a:latin typeface="Cambria Math" panose="02040503050406030204" pitchFamily="18" charset="0"/>
+                                  <a:ea typeface="Cambria Math" panose="02040503050406030204" pitchFamily="18" charset="0"/>
                                 </a:rPr>
-                                <m:t>𝑆</m:t>
-                              </m:r>
-                              <m:r>
-                                <a:rPr lang="en-US" sz="2000" i="1">
-                                  <a:solidFill>
-                                    <a:srgbClr val="000000"/>
-                                  </a:solidFill>
-                                  <a:latin typeface="Cambria Math" panose="02040503050406030204" pitchFamily="18" charset="0"/>
-                                </a:rPr>
-                                <m:t>)</m:t>
-                              </m:r>
-                            </m:num>
-                            <m:den>
-                              <m:r>
-                                <a:rPr lang="en-US" sz="2000" i="1">
-                                  <a:solidFill>
-                                    <a:srgbClr val="000000"/>
-                                  </a:solidFill>
-                                  <a:latin typeface="Cambria Math" panose="02040503050406030204" pitchFamily="18" charset="0"/>
-                                </a:rPr>
-                                <m:t>𝑆</m:t>
-                              </m:r>
-                            </m:den>
-                          </m:f>
+                              </m:ctrlPr>
+                            </m:dPr>
+                            <m:e>
+                              <m:f>
+                                <m:fPr>
+                                  <m:ctrlPr>
+                                    <a:rPr lang="en-US" sz="2000" i="1">
+                                      <a:solidFill>
+                                        <a:srgbClr val="000000"/>
+                                      </a:solidFill>
+                                      <a:latin typeface="Cambria Math" panose="02040503050406030204" pitchFamily="18" charset="0"/>
+                                    </a:rPr>
+                                  </m:ctrlPr>
+                                </m:fPr>
+                                <m:num>
+                                  <m:r>
+                                    <a:rPr lang="en-US" sz="2000" b="0" i="1" smtClean="0">
+                                      <a:solidFill>
+                                        <a:srgbClr val="000000"/>
+                                      </a:solidFill>
+                                      <a:latin typeface="Cambria Math" panose="02040503050406030204" pitchFamily="18" charset="0"/>
+                                    </a:rPr>
+                                    <m:t>𝐻</m:t>
+                                  </m:r>
+                                  <m:r>
+                                    <a:rPr lang="en-US" sz="2000" i="1">
+                                      <a:solidFill>
+                                        <a:srgbClr val="000000"/>
+                                      </a:solidFill>
+                                      <a:latin typeface="Cambria Math" panose="02040503050406030204" pitchFamily="18" charset="0"/>
+                                    </a:rPr>
+                                    <m:t>(</m:t>
+                                  </m:r>
+                                  <m:r>
+                                    <a:rPr lang="en-US" sz="2000" i="1">
+                                      <a:solidFill>
+                                        <a:srgbClr val="000000"/>
+                                      </a:solidFill>
+                                      <a:latin typeface="Cambria Math" panose="02040503050406030204" pitchFamily="18" charset="0"/>
+                                    </a:rPr>
+                                    <m:t>𝑆</m:t>
+                                  </m:r>
+                                  <m:r>
+                                    <a:rPr lang="en-US" sz="2000" i="1">
+                                      <a:solidFill>
+                                        <a:srgbClr val="000000"/>
+                                      </a:solidFill>
+                                      <a:latin typeface="Cambria Math" panose="02040503050406030204" pitchFamily="18" charset="0"/>
+                                    </a:rPr>
+                                    <m:t>)</m:t>
+                                  </m:r>
+                                </m:num>
+                                <m:den>
+                                  <m:r>
+                                    <a:rPr lang="en-US" sz="2000" i="1">
+                                      <a:solidFill>
+                                        <a:srgbClr val="000000"/>
+                                      </a:solidFill>
+                                      <a:latin typeface="Cambria Math" panose="02040503050406030204" pitchFamily="18" charset="0"/>
+                                    </a:rPr>
+                                    <m:t>𝑆</m:t>
+                                  </m:r>
+                                </m:den>
+                              </m:f>
+                            </m:e>
+                          </m:d>
                         </m:e>
                       </m:d>
                       <m:r>
@@ -8706,7 +8849,6 @@
           </a:bodyPr>
           <a:lstStyle/>
           <a:p>
-            <a:pPr/>
             <a:endParaRPr lang="en-US" sz="2400" dirty="0"/>
           </a:p>
         </p:txBody>
@@ -8890,8 +9032,8 @@
                           </m:ctrlPr>
                         </m:dPr>
                         <m:e>
-                          <m:f>
-                            <m:fPr>
+                          <m:sSup>
+                            <m:sSupPr>
                               <m:ctrlPr>
                                 <a:rPr lang="en-US" sz="2000" i="1">
                                   <a:solidFill>
@@ -8900,8 +9042,20 @@
                                   <a:latin typeface="Cambria Math" panose="02040503050406030204" pitchFamily="18" charset="0"/>
                                 </a:rPr>
                               </m:ctrlPr>
-                            </m:fPr>
-                            <m:num>
+                            </m:sSupPr>
+                            <m:e>
+                              <m:r>
+                                <a:rPr lang="en-US" sz="2000" i="1">
+                                  <a:solidFill>
+                                    <a:srgbClr val="000000"/>
+                                  </a:solidFill>
+                                  <a:latin typeface="Cambria Math" panose="02040503050406030204" pitchFamily="18" charset="0"/>
+                                  <a:ea typeface="Cambria Math" panose="02040503050406030204" pitchFamily="18" charset="0"/>
+                                </a:rPr>
+                                <m:t>ℒ</m:t>
+                              </m:r>
+                            </m:e>
+                            <m:sup>
                               <m:r>
                                 <a:rPr lang="en-US" sz="2000" i="1">
                                   <a:solidFill>
@@ -8918,19 +9072,83 @@
                                   </a:solidFill>
                                   <a:latin typeface="Cambria Math" panose="02040503050406030204" pitchFamily="18" charset="0"/>
                                 </a:rPr>
-                                <m:t>2</m:t>
+                                <m:t>1</m:t>
                               </m:r>
-                            </m:num>
-                            <m:den>
-                              <m:r>
-                                <a:rPr lang="en-US" sz="2000" i="1">
+                            </m:sup>
+                          </m:sSup>
+                          <m:d>
+                            <m:dPr>
+                              <m:ctrlPr>
+                                <a:rPr lang="en-US" sz="2000" i="1" smtClean="0">
                                   <a:solidFill>
                                     <a:srgbClr val="000000"/>
                                   </a:solidFill>
                                   <a:latin typeface="Cambria Math" panose="02040503050406030204" pitchFamily="18" charset="0"/>
                                 </a:rPr>
-                                <m:t>𝑆</m:t>
-                              </m:r>
+                              </m:ctrlPr>
+                            </m:dPr>
+                            <m:e>
+                              <m:f>
+                                <m:fPr>
+                                  <m:ctrlPr>
+                                    <a:rPr lang="en-US" sz="2000" i="1">
+                                      <a:solidFill>
+                                        <a:srgbClr val="000000"/>
+                                      </a:solidFill>
+                                      <a:latin typeface="Cambria Math" panose="02040503050406030204" pitchFamily="18" charset="0"/>
+                                    </a:rPr>
+                                  </m:ctrlPr>
+                                </m:fPr>
+                                <m:num>
+                                  <m:r>
+                                    <a:rPr lang="en-US" sz="2000" i="1">
+                                      <a:solidFill>
+                                        <a:srgbClr val="000000"/>
+                                      </a:solidFill>
+                                      <a:latin typeface="Cambria Math" panose="02040503050406030204" pitchFamily="18" charset="0"/>
+                                    </a:rPr>
+                                    <m:t>−</m:t>
+                                  </m:r>
+                                  <m:r>
+                                    <a:rPr lang="en-US" sz="2000" i="1">
+                                      <a:solidFill>
+                                        <a:srgbClr val="000000"/>
+                                      </a:solidFill>
+                                      <a:latin typeface="Cambria Math" panose="02040503050406030204" pitchFamily="18" charset="0"/>
+                                    </a:rPr>
+                                    <m:t>2</m:t>
+                                  </m:r>
+                                </m:num>
+                                <m:den>
+                                  <m:r>
+                                    <a:rPr lang="en-US" sz="2000" i="1">
+                                      <a:solidFill>
+                                        <a:srgbClr val="000000"/>
+                                      </a:solidFill>
+                                      <a:latin typeface="Cambria Math" panose="02040503050406030204" pitchFamily="18" charset="0"/>
+                                    </a:rPr>
+                                    <m:t>𝑆</m:t>
+                                  </m:r>
+                                  <m:r>
+                                    <a:rPr lang="en-US" sz="2000" i="1">
+                                      <a:solidFill>
+                                        <a:srgbClr val="000000"/>
+                                      </a:solidFill>
+                                      <a:latin typeface="Cambria Math" panose="02040503050406030204" pitchFamily="18" charset="0"/>
+                                    </a:rPr>
+                                    <m:t>+</m:t>
+                                  </m:r>
+                                  <m:r>
+                                    <a:rPr lang="en-US" sz="2000" i="1">
+                                      <a:solidFill>
+                                        <a:srgbClr val="000000"/>
+                                      </a:solidFill>
+                                      <a:latin typeface="Cambria Math" panose="02040503050406030204" pitchFamily="18" charset="0"/>
+                                    </a:rPr>
+                                    <m:t>2</m:t>
+                                  </m:r>
+                                </m:den>
+                              </m:f>
                               <m:r>
                                 <a:rPr lang="en-US" sz="2000" i="1">
                                   <a:solidFill>
@@ -8940,78 +9158,60 @@
                                 </a:rPr>
                                 <m:t>+</m:t>
                               </m:r>
-                              <m:r>
-                                <a:rPr lang="en-US" sz="2000" i="1">
-                                  <a:solidFill>
-                                    <a:srgbClr val="000000"/>
-                                  </a:solidFill>
-                                  <a:latin typeface="Cambria Math" panose="02040503050406030204" pitchFamily="18" charset="0"/>
-                                </a:rPr>
-                                <m:t>2</m:t>
-                              </m:r>
-                            </m:den>
-                          </m:f>
-                          <m:r>
-                            <a:rPr lang="en-US" sz="2000" i="1">
-                              <a:solidFill>
-                                <a:srgbClr val="000000"/>
-                              </a:solidFill>
-                              <a:latin typeface="Cambria Math" panose="02040503050406030204" pitchFamily="18" charset="0"/>
-                            </a:rPr>
-                            <m:t>+</m:t>
-                          </m:r>
-                          <m:f>
-                            <m:fPr>
-                              <m:ctrlPr>
-                                <a:rPr lang="en-US" sz="2000" i="1">
-                                  <a:solidFill>
-                                    <a:srgbClr val="000000"/>
-                                  </a:solidFill>
-                                  <a:latin typeface="Cambria Math" panose="02040503050406030204" pitchFamily="18" charset="0"/>
-                                </a:rPr>
-                              </m:ctrlPr>
-                            </m:fPr>
-                            <m:num>
-                              <m:r>
-                                <a:rPr lang="en-US" sz="2000" i="1">
-                                  <a:solidFill>
-                                    <a:srgbClr val="000000"/>
-                                  </a:solidFill>
-                                  <a:latin typeface="Cambria Math" panose="02040503050406030204" pitchFamily="18" charset="0"/>
-                                </a:rPr>
-                                <m:t>2</m:t>
-                              </m:r>
-                            </m:num>
-                            <m:den>
-                              <m:r>
-                                <a:rPr lang="en-US" sz="2000" i="1">
-                                  <a:solidFill>
-                                    <a:srgbClr val="000000"/>
-                                  </a:solidFill>
-                                  <a:latin typeface="Cambria Math" panose="02040503050406030204" pitchFamily="18" charset="0"/>
-                                </a:rPr>
-                                <m:t>𝑆</m:t>
-                              </m:r>
-                              <m:r>
-                                <a:rPr lang="en-US" sz="2000" i="1">
-                                  <a:solidFill>
-                                    <a:srgbClr val="000000"/>
-                                  </a:solidFill>
-                                  <a:latin typeface="Cambria Math" panose="02040503050406030204" pitchFamily="18" charset="0"/>
-                                </a:rPr>
-                                <m:t>+</m:t>
-                              </m:r>
-                              <m:r>
-                                <a:rPr lang="en-US" sz="2000" i="1">
-                                  <a:solidFill>
-                                    <a:srgbClr val="000000"/>
-                                  </a:solidFill>
-                                  <a:latin typeface="Cambria Math" panose="02040503050406030204" pitchFamily="18" charset="0"/>
-                                </a:rPr>
-                                <m:t>1</m:t>
-                              </m:r>
-                            </m:den>
-                          </m:f>
+                              <m:f>
+                                <m:fPr>
+                                  <m:ctrlPr>
+                                    <a:rPr lang="en-US" sz="2000" i="1">
+                                      <a:solidFill>
+                                        <a:srgbClr val="000000"/>
+                                      </a:solidFill>
+                                      <a:latin typeface="Cambria Math" panose="02040503050406030204" pitchFamily="18" charset="0"/>
+                                    </a:rPr>
+                                  </m:ctrlPr>
+                                </m:fPr>
+                                <m:num>
+                                  <m:r>
+                                    <a:rPr lang="en-US" sz="2000" i="1">
+                                      <a:solidFill>
+                                        <a:srgbClr val="000000"/>
+                                      </a:solidFill>
+                                      <a:latin typeface="Cambria Math" panose="02040503050406030204" pitchFamily="18" charset="0"/>
+                                    </a:rPr>
+                                    <m:t>2</m:t>
+                                  </m:r>
+                                </m:num>
+                                <m:den>
+                                  <m:r>
+                                    <a:rPr lang="en-US" sz="2000" i="1">
+                                      <a:solidFill>
+                                        <a:srgbClr val="000000"/>
+                                      </a:solidFill>
+                                      <a:latin typeface="Cambria Math" panose="02040503050406030204" pitchFamily="18" charset="0"/>
+                                    </a:rPr>
+                                    <m:t>𝑆</m:t>
+                                  </m:r>
+                                  <m:r>
+                                    <a:rPr lang="en-US" sz="2000" i="1">
+                                      <a:solidFill>
+                                        <a:srgbClr val="000000"/>
+                                      </a:solidFill>
+                                      <a:latin typeface="Cambria Math" panose="02040503050406030204" pitchFamily="18" charset="0"/>
+                                    </a:rPr>
+                                    <m:t>+</m:t>
+                                  </m:r>
+                                  <m:r>
+                                    <a:rPr lang="en-US" sz="2000" i="1">
+                                      <a:solidFill>
+                                        <a:srgbClr val="000000"/>
+                                      </a:solidFill>
+                                      <a:latin typeface="Cambria Math" panose="02040503050406030204" pitchFamily="18" charset="0"/>
+                                    </a:rPr>
+                                    <m:t>1</m:t>
+                                  </m:r>
+                                </m:den>
+                              </m:f>
+                            </m:e>
+                          </m:d>
                         </m:e>
                       </m:d>
                       <m:r>
@@ -9621,8 +9821,8 @@
           </p:sp>
         </mc:Fallback>
       </mc:AlternateContent>
-      <mc:AlternateContent xmlns:mc="http://schemas.openxmlformats.org/markup-compatibility/2006">
-        <mc:Choice xmlns:a14="http://schemas.microsoft.com/office/drawing/2010/main" Requires="a14">
+      <mc:AlternateContent xmlns:mc="http://schemas.openxmlformats.org/markup-compatibility/2006" xmlns:a14="http://schemas.microsoft.com/office/drawing/2010/main">
+        <mc:Choice Requires="a14">
           <p:sp>
             <p:nvSpPr>
               <p:cNvPr id="33" name="Object 5">
@@ -10536,13 +10736,12 @@
                 <a:endParaRPr lang="en-US" sz="2000" dirty="0"/>
               </a:p>
               <a:p>
-                <a:pPr/>
                 <a:endParaRPr lang="en-US" sz="2000" dirty="0"/>
               </a:p>
             </p:txBody>
           </p:sp>
         </mc:Choice>
-        <mc:Fallback>
+        <mc:Fallback xmlns="">
           <p:sp>
             <p:nvSpPr>
               <p:cNvPr id="33" name="Object 5">
@@ -10688,8 +10887,8 @@
           </a:p>
         </p:txBody>
       </p:sp>
-      <mc:AlternateContent xmlns:mc="http://schemas.openxmlformats.org/markup-compatibility/2006">
-        <mc:Choice xmlns:a14="http://schemas.microsoft.com/office/drawing/2010/main" Requires="a14">
+      <mc:AlternateContent xmlns:mc="http://schemas.openxmlformats.org/markup-compatibility/2006" xmlns:a14="http://schemas.microsoft.com/office/drawing/2010/main">
+        <mc:Choice Requires="a14">
           <p:sp>
             <p:nvSpPr>
               <p:cNvPr id="13" name="Object 5">
@@ -10882,7 +11081,7 @@
             </p:txBody>
           </p:sp>
         </mc:Choice>
-        <mc:Fallback>
+        <mc:Fallback xmlns="">
           <p:sp>
             <p:nvSpPr>
               <p:cNvPr id="13" name="Object 5">
@@ -11533,7 +11732,7 @@
             </a:pPr>
             <a:r>
               <a:rPr lang="ar-SY" sz="2400" b="1" dirty="0"/>
-              <a:t>تقرب قيم الإشارة المتقطعة الواقعة بين مستويين من مستويات التكميم فإنها تقرب إلى </a:t>
+              <a:t>تقرب قيم الإشارة المتقطعة الواقعة بين مستويين من مستويات التكميم إلى </a:t>
             </a:r>
             <a:r>
               <a:rPr lang="ar-SY" sz="2400" b="1" dirty="0">
@@ -15275,21 +15474,8 @@
                   <a:srgbClr val="FF0000"/>
                 </a:solidFill>
               </a:rPr>
-              <a:t>Anti-aliasing Filters</a:t>
-            </a:r>
-            <a:r>
-              <a:rPr lang="ar-SY" sz="3600" b="1" dirty="0">
-                <a:solidFill>
-                  <a:srgbClr val="FF0000"/>
-                </a:solidFill>
-              </a:rPr>
-              <a:t> </a:t>
-            </a:r>
-            <a:endParaRPr lang="en-US" sz="3600" b="1" dirty="0">
-              <a:solidFill>
-                <a:srgbClr val="FF0000"/>
-              </a:solidFill>
-            </a:endParaRPr>
+              <a:t>Anti-aliasing Filter</a:t>
+            </a:r>
           </a:p>
         </p:txBody>
       </p:sp>
@@ -21746,8 +21932,8 @@
           </a:p>
         </p:txBody>
       </p:sp>
-      <mc:AlternateContent xmlns:mc="http://schemas.openxmlformats.org/markup-compatibility/2006" xmlns:a14="http://schemas.microsoft.com/office/drawing/2010/main">
-        <mc:Choice Requires="a14">
+      <mc:AlternateContent xmlns:mc="http://schemas.openxmlformats.org/markup-compatibility/2006">
+        <mc:Choice xmlns:a14="http://schemas.microsoft.com/office/drawing/2010/main" Requires="a14">
           <p:sp>
             <p:nvSpPr>
               <p:cNvPr id="5" name="Rectangle 4">
@@ -21796,7 +21982,19 @@
                 </a:r>
                 <a:r>
                   <a:rPr lang="ar-SY" sz="2400" b="1" dirty="0"/>
-                  <a:t>ضعف أعلى تردد للإشارة (تردد </a:t>
+                  <a:t>ضعف </a:t>
+                </a:r>
+                <a:r>
+                  <a:rPr lang="ar-SY" sz="2400" b="1" dirty="0">
+                    <a:solidFill>
+                      <a:srgbClr val="FF0000"/>
+                    </a:solidFill>
+                  </a:rPr>
+                  <a:t>أعلى</a:t>
+                </a:r>
+                <a:r>
+                  <a:rPr lang="ar-SY" sz="2400" b="1" dirty="0"/>
+                  <a:t> تردد للإشارة (تردد </a:t>
                 </a:r>
                 <a:r>
                   <a:rPr lang="ar-SY" sz="2400" b="1" dirty="0" err="1"/>
@@ -21896,7 +22094,7 @@
             </p:txBody>
           </p:sp>
         </mc:Choice>
-        <mc:Fallback xmlns="">
+        <mc:Fallback>
           <p:sp>
             <p:nvSpPr>
               <p:cNvPr id="5" name="Rectangle 4">
@@ -24978,8 +25176,8 @@
           </a:p>
         </p:txBody>
       </p:sp>
-      <mc:AlternateContent xmlns:mc="http://schemas.openxmlformats.org/markup-compatibility/2006" xmlns:a14="http://schemas.microsoft.com/office/drawing/2010/main">
-        <mc:Choice Requires="a14">
+      <mc:AlternateContent xmlns:mc="http://schemas.openxmlformats.org/markup-compatibility/2006">
+        <mc:Choice xmlns:a14="http://schemas.microsoft.com/office/drawing/2010/main" Requires="a14">
           <p:sp>
             <p:nvSpPr>
               <p:cNvPr id="6" name="Object 5">
@@ -25004,7 +25202,7 @@
             </p:spPr>
             <p:txBody>
               <a:bodyPr>
-                <a:normAutofit/>
+                <a:normAutofit fontScale="92500"/>
               </a:bodyPr>
               <a:lstStyle/>
               <a:p>
@@ -25143,67 +25341,126 @@
                           </m:ctrlPr>
                         </m:dPr>
                         <m:e>
-                          <m:f>
-                            <m:fPr>
+                          <m:sSup>
+                            <m:sSupPr>
                               <m:ctrlPr>
-                                <a:rPr lang="en-US" sz="2400" i="1">
+                                <a:rPr lang="en-US" sz="2400" i="1" smtClean="0">
                                   <a:solidFill>
                                     <a:srgbClr val="000000"/>
                                   </a:solidFill>
                                   <a:latin typeface="Cambria Math" panose="02040503050406030204" pitchFamily="18" charset="0"/>
                                 </a:rPr>
                               </m:ctrlPr>
-                            </m:fPr>
-                            <m:num>
+                            </m:sSupPr>
+                            <m:e>
                               <m:r>
                                 <a:rPr lang="en-US" sz="2400" i="1">
                                   <a:solidFill>
                                     <a:srgbClr val="000000"/>
                                   </a:solidFill>
                                   <a:latin typeface="Cambria Math" panose="02040503050406030204" pitchFamily="18" charset="0"/>
+                                  <a:ea typeface="Cambria Math" panose="02040503050406030204" pitchFamily="18" charset="0"/>
                                 </a:rPr>
-                                <m:t>𝐺</m:t>
+                                <m:t>ℒ</m:t>
                               </m:r>
+                            </m:e>
+                            <m:sup>
                               <m:r>
-                                <a:rPr lang="en-US" sz="2400" i="1">
+                                <a:rPr lang="en-US" sz="2400" b="0" i="1" smtClean="0">
                                   <a:solidFill>
                                     <a:srgbClr val="000000"/>
                                   </a:solidFill>
                                   <a:latin typeface="Cambria Math" panose="02040503050406030204" pitchFamily="18" charset="0"/>
                                 </a:rPr>
-                                <m:t>(</m:t>
+                                <m:t>−</m:t>
                               </m:r>
                               <m:r>
-                                <a:rPr lang="en-US" sz="2400" i="1">
+                                <a:rPr lang="en-US" sz="2400" b="0" i="1" smtClean="0">
                                   <a:solidFill>
                                     <a:srgbClr val="000000"/>
                                   </a:solidFill>
                                   <a:latin typeface="Cambria Math" panose="02040503050406030204" pitchFamily="18" charset="0"/>
                                 </a:rPr>
-                                <m:t>𝑆</m:t>
+                                <m:t>1</m:t>
                               </m:r>
-                              <m:r>
-                                <a:rPr lang="en-US" sz="2400" i="1">
+                            </m:sup>
+                          </m:sSup>
+                          <m:d>
+                            <m:dPr>
+                              <m:ctrlPr>
+                                <a:rPr lang="en-US" sz="2400" i="1" smtClean="0">
                                   <a:solidFill>
                                     <a:srgbClr val="000000"/>
                                   </a:solidFill>
                                   <a:latin typeface="Cambria Math" panose="02040503050406030204" pitchFamily="18" charset="0"/>
+                                  <a:ea typeface="Cambria Math" panose="02040503050406030204" pitchFamily="18" charset="0"/>
                                 </a:rPr>
-                                <m:t>)</m:t>
-                              </m:r>
-                            </m:num>
-                            <m:den>
-                              <m:r>
-                                <a:rPr lang="en-US" sz="2400" i="1">
-                                  <a:solidFill>
-                                    <a:srgbClr val="000000"/>
-                                  </a:solidFill>
-                                  <a:latin typeface="Cambria Math" panose="02040503050406030204" pitchFamily="18" charset="0"/>
-                                </a:rPr>
-                                <m:t>𝑆</m:t>
-                              </m:r>
-                            </m:den>
-                          </m:f>
+                              </m:ctrlPr>
+                            </m:dPr>
+                            <m:e>
+                              <m:f>
+                                <m:fPr>
+                                  <m:ctrlPr>
+                                    <a:rPr lang="en-US" sz="2400" i="1">
+                                      <a:solidFill>
+                                        <a:srgbClr val="000000"/>
+                                      </a:solidFill>
+                                      <a:latin typeface="Cambria Math" panose="02040503050406030204" pitchFamily="18" charset="0"/>
+                                    </a:rPr>
+                                  </m:ctrlPr>
+                                </m:fPr>
+                                <m:num>
+                                  <m:r>
+                                    <a:rPr lang="en-US" sz="2400" i="1">
+                                      <a:solidFill>
+                                        <a:srgbClr val="000000"/>
+                                      </a:solidFill>
+                                      <a:latin typeface="Cambria Math" panose="02040503050406030204" pitchFamily="18" charset="0"/>
+                                    </a:rPr>
+                                    <m:t>𝐺</m:t>
+                                  </m:r>
+                                  <m:r>
+                                    <a:rPr lang="en-US" sz="2400" i="1">
+                                      <a:solidFill>
+                                        <a:srgbClr val="000000"/>
+                                      </a:solidFill>
+                                      <a:latin typeface="Cambria Math" panose="02040503050406030204" pitchFamily="18" charset="0"/>
+                                    </a:rPr>
+                                    <m:t>(</m:t>
+                                  </m:r>
+                                  <m:r>
+                                    <a:rPr lang="en-US" sz="2400" i="1">
+                                      <a:solidFill>
+                                        <a:srgbClr val="000000"/>
+                                      </a:solidFill>
+                                      <a:latin typeface="Cambria Math" panose="02040503050406030204" pitchFamily="18" charset="0"/>
+                                    </a:rPr>
+                                    <m:t>𝑆</m:t>
+                                  </m:r>
+                                  <m:r>
+                                    <a:rPr lang="en-US" sz="2400" i="1">
+                                      <a:solidFill>
+                                        <a:srgbClr val="000000"/>
+                                      </a:solidFill>
+                                      <a:latin typeface="Cambria Math" panose="02040503050406030204" pitchFamily="18" charset="0"/>
+                                    </a:rPr>
+                                    <m:t>)</m:t>
+                                  </m:r>
+                                </m:num>
+                                <m:den>
+                                  <m:r>
+                                    <a:rPr lang="en-US" sz="2400" i="1">
+                                      <a:solidFill>
+                                        <a:srgbClr val="000000"/>
+                                      </a:solidFill>
+                                      <a:latin typeface="Cambria Math" panose="02040503050406030204" pitchFamily="18" charset="0"/>
+                                    </a:rPr>
+                                    <m:t>𝑆</m:t>
+                                  </m:r>
+                                </m:den>
+                              </m:f>
+                            </m:e>
+                          </m:d>
                         </m:e>
                       </m:d>
                     </m:oMath>
@@ -25214,7 +25471,7 @@
             </p:txBody>
           </p:sp>
         </mc:Choice>
-        <mc:Fallback xmlns="">
+        <mc:Fallback>
           <p:sp>
             <p:nvSpPr>
               <p:cNvPr id="6" name="Object 5">
@@ -25259,8 +25516,8 @@
           </p:sp>
         </mc:Fallback>
       </mc:AlternateContent>
-      <mc:AlternateContent xmlns:mc="http://schemas.openxmlformats.org/markup-compatibility/2006" xmlns:a14="http://schemas.microsoft.com/office/drawing/2010/main">
-        <mc:Choice Requires="a14">
+      <mc:AlternateContent xmlns:mc="http://schemas.openxmlformats.org/markup-compatibility/2006">
+        <mc:Choice xmlns:a14="http://schemas.microsoft.com/office/drawing/2010/main" Requires="a14">
           <p:sp>
             <p:nvSpPr>
               <p:cNvPr id="9" name="Object 5">
@@ -25285,7 +25542,7 @@
             </p:spPr>
             <p:txBody>
               <a:bodyPr>
-                <a:normAutofit/>
+                <a:normAutofit fontScale="92500"/>
               </a:bodyPr>
               <a:lstStyle/>
               <a:p>
@@ -25433,8 +25690,8 @@
                           </m:ctrlPr>
                         </m:dPr>
                         <m:e>
-                          <m:f>
-                            <m:fPr>
+                          <m:sSup>
+                            <m:sSupPr>
                               <m:ctrlPr>
                                 <a:rPr lang="en-US" sz="2400" i="1">
                                   <a:solidFill>
@@ -25443,8 +25700,20 @@
                                   <a:latin typeface="Cambria Math" panose="02040503050406030204" pitchFamily="18" charset="0"/>
                                 </a:rPr>
                               </m:ctrlPr>
-                            </m:fPr>
-                            <m:num>
+                            </m:sSupPr>
+                            <m:e>
+                              <m:r>
+                                <a:rPr lang="en-US" sz="2400" i="1">
+                                  <a:solidFill>
+                                    <a:srgbClr val="000000"/>
+                                  </a:solidFill>
+                                  <a:latin typeface="Cambria Math" panose="02040503050406030204" pitchFamily="18" charset="0"/>
+                                  <a:ea typeface="Cambria Math" panose="02040503050406030204" pitchFamily="18" charset="0"/>
+                                </a:rPr>
+                                <m:t>ℒ</m:t>
+                              </m:r>
+                            </m:e>
+                            <m:sup>
                               <m:r>
                                 <a:rPr lang="en-US" sz="2400" i="1">
                                   <a:solidFill>
@@ -25452,7 +25721,7 @@
                                   </a:solidFill>
                                   <a:latin typeface="Cambria Math" panose="02040503050406030204" pitchFamily="18" charset="0"/>
                                 </a:rPr>
-                                <m:t>𝐺</m:t>
+                                <m:t>−</m:t>
                               </m:r>
                               <m:r>
                                 <a:rPr lang="en-US" sz="2400" i="1">
@@ -25461,42 +25730,55 @@
                                   </a:solidFill>
                                   <a:latin typeface="Cambria Math" panose="02040503050406030204" pitchFamily="18" charset="0"/>
                                 </a:rPr>
-                                <m:t>(</m:t>
+                                <m:t>1</m:t>
                               </m:r>
-                              <m:r>
+                            </m:sup>
+                          </m:sSup>
+                          <m:d>
+                            <m:dPr>
+                              <m:ctrlPr>
                                 <a:rPr lang="en-US" sz="2400" i="1">
                                   <a:solidFill>
                                     <a:srgbClr val="000000"/>
                                   </a:solidFill>
                                   <a:latin typeface="Cambria Math" panose="02040503050406030204" pitchFamily="18" charset="0"/>
+                                  <a:ea typeface="Cambria Math" panose="02040503050406030204" pitchFamily="18" charset="0"/>
                                 </a:rPr>
-                                <m:t>𝑆</m:t>
-                              </m:r>
-                              <m:r>
-                                <a:rPr lang="en-US" sz="2400" i="1">
-                                  <a:solidFill>
-                                    <a:srgbClr val="000000"/>
-                                  </a:solidFill>
-                                  <a:latin typeface="Cambria Math" panose="02040503050406030204" pitchFamily="18" charset="0"/>
-                                </a:rPr>
-                                <m:t>)</m:t>
-                              </m:r>
-                            </m:num>
-                            <m:den>
-                              <m:sSup>
-                                <m:sSupPr>
+                              </m:ctrlPr>
+                            </m:dPr>
+                            <m:e>
+                              <m:f>
+                                <m:fPr>
                                   <m:ctrlPr>
-                                    <a:rPr lang="en-US" sz="2400" i="1" smtClean="0">
+                                    <a:rPr lang="en-US" sz="2400" i="1">
                                       <a:solidFill>
                                         <a:srgbClr val="000000"/>
                                       </a:solidFill>
                                       <a:latin typeface="Cambria Math" panose="02040503050406030204" pitchFamily="18" charset="0"/>
                                     </a:rPr>
                                   </m:ctrlPr>
-                                </m:sSupPr>
-                                <m:e>
+                                </m:fPr>
+                                <m:num>
                                   <m:r>
-                                    <a:rPr lang="en-US" sz="2400" b="0" i="1" smtClean="0">
+                                    <a:rPr lang="en-US" sz="2400" i="1">
+                                      <a:solidFill>
+                                        <a:srgbClr val="000000"/>
+                                      </a:solidFill>
+                                      <a:latin typeface="Cambria Math" panose="02040503050406030204" pitchFamily="18" charset="0"/>
+                                    </a:rPr>
+                                    <m:t>𝐺</m:t>
+                                  </m:r>
+                                  <m:r>
+                                    <a:rPr lang="en-US" sz="2400" i="1">
+                                      <a:solidFill>
+                                        <a:srgbClr val="000000"/>
+                                      </a:solidFill>
+                                      <a:latin typeface="Cambria Math" panose="02040503050406030204" pitchFamily="18" charset="0"/>
+                                    </a:rPr>
+                                    <m:t>(</m:t>
+                                  </m:r>
+                                  <m:r>
+                                    <a:rPr lang="en-US" sz="2400" i="1">
                                       <a:solidFill>
                                         <a:srgbClr val="000000"/>
                                       </a:solidFill>
@@ -25504,21 +25786,30 @@
                                     </a:rPr>
                                     <m:t>𝑆</m:t>
                                   </m:r>
-                                </m:e>
-                                <m:sup>
                                   <m:r>
-                                    <a:rPr lang="en-US" sz="2400" b="0" i="1" smtClean="0">
+                                    <a:rPr lang="en-US" sz="2400" i="1">
                                       <a:solidFill>
                                         <a:srgbClr val="000000"/>
                                       </a:solidFill>
                                       <a:latin typeface="Cambria Math" panose="02040503050406030204" pitchFamily="18" charset="0"/>
                                     </a:rPr>
-                                    <m:t>2</m:t>
+                                    <m:t>)</m:t>
                                   </m:r>
-                                </m:sup>
-                              </m:sSup>
-                            </m:den>
-                          </m:f>
+                                </m:num>
+                                <m:den>
+                                  <m:r>
+                                    <a:rPr lang="en-US" sz="2400" i="1">
+                                      <a:solidFill>
+                                        <a:srgbClr val="000000"/>
+                                      </a:solidFill>
+                                      <a:latin typeface="Cambria Math" panose="02040503050406030204" pitchFamily="18" charset="0"/>
+                                    </a:rPr>
+                                    <m:t>𝑆</m:t>
+                                  </m:r>
+                                </m:den>
+                              </m:f>
+                            </m:e>
+                          </m:d>
                         </m:e>
                       </m:d>
                     </m:oMath>
@@ -25529,7 +25820,7 @@
             </p:txBody>
           </p:sp>
         </mc:Choice>
-        <mc:Fallback xmlns="">
+        <mc:Fallback>
           <p:sp>
             <p:nvSpPr>
               <p:cNvPr id="9" name="Object 5">

</xml_diff>